<commit_message>
[Memoria] - Añadir un diagrama de clases del metamodelo
</commit_message>
<xml_diff>
--- a/planning-and-logs/T2A-v0.001.pptx
+++ b/planning-and-logs/T2A-v0.001.pptx
@@ -5,26 +5,28 @@
     <p:sldMasterId id="2147483648" r:id="rId1"/>
   </p:sldMasterIdLst>
   <p:notesMasterIdLst>
-    <p:notesMasterId r:id="rId19"/>
+    <p:notesMasterId r:id="rId21"/>
   </p:notesMasterIdLst>
   <p:sldIdLst>
     <p:sldId id="256" r:id="rId2"/>
     <p:sldId id="258" r:id="rId3"/>
     <p:sldId id="257" r:id="rId4"/>
-    <p:sldId id="262" r:id="rId5"/>
-    <p:sldId id="259" r:id="rId6"/>
-    <p:sldId id="260" r:id="rId7"/>
-    <p:sldId id="261" r:id="rId8"/>
-    <p:sldId id="272" r:id="rId9"/>
-    <p:sldId id="263" r:id="rId10"/>
-    <p:sldId id="264" r:id="rId11"/>
-    <p:sldId id="265" r:id="rId12"/>
-    <p:sldId id="266" r:id="rId13"/>
-    <p:sldId id="267" r:id="rId14"/>
-    <p:sldId id="268" r:id="rId15"/>
-    <p:sldId id="269" r:id="rId16"/>
-    <p:sldId id="270" r:id="rId17"/>
-    <p:sldId id="271" r:id="rId18"/>
+    <p:sldId id="273" r:id="rId5"/>
+    <p:sldId id="274" r:id="rId6"/>
+    <p:sldId id="262" r:id="rId7"/>
+    <p:sldId id="259" r:id="rId8"/>
+    <p:sldId id="260" r:id="rId9"/>
+    <p:sldId id="261" r:id="rId10"/>
+    <p:sldId id="272" r:id="rId11"/>
+    <p:sldId id="263" r:id="rId12"/>
+    <p:sldId id="264" r:id="rId13"/>
+    <p:sldId id="265" r:id="rId14"/>
+    <p:sldId id="266" r:id="rId15"/>
+    <p:sldId id="267" r:id="rId16"/>
+    <p:sldId id="268" r:id="rId17"/>
+    <p:sldId id="269" r:id="rId18"/>
+    <p:sldId id="270" r:id="rId19"/>
+    <p:sldId id="271" r:id="rId20"/>
   </p:sldIdLst>
   <p:sldSz cx="12192000" cy="6858000"/>
   <p:notesSz cx="6858000" cy="9144000"/>
@@ -139,6 +141,8 @@
         <p14:section name="Xtext-Metamodelo" id="{EF9688A6-152C-426F-8571-78AA68AC137E}">
           <p14:sldIdLst>
             <p14:sldId id="257"/>
+            <p14:sldId id="273"/>
+            <p14:sldId id="274"/>
           </p14:sldIdLst>
         </p14:section>
         <p14:section name="Código Esperado" id="{3EFAD5F2-78E8-4FE1-9B0A-7E98BF7AE64F}">
@@ -258,7 +262,7 @@
           <a:p>
             <a:fld id="{194A7CD5-1EE3-4747-97A3-E1E3716A41A1}" type="datetimeFigureOut">
               <a:rPr lang="zh-CN" altLang="en-US" smtClean="0"/>
-              <a:t>2023/2/16</a:t>
+              <a:t>2023/2/25</a:t>
             </a:fld>
             <a:endParaRPr lang="zh-CN" altLang="en-US"/>
           </a:p>
@@ -672,7 +676,7 @@
           <a:p>
             <a:fld id="{BB281D37-F1C1-421D-B41B-B00CEF0412D1}" type="datetimeFigureOut">
               <a:rPr lang="zh-CN" altLang="en-US" smtClean="0"/>
-              <a:t>2023/2/16</a:t>
+              <a:t>2023/2/25</a:t>
             </a:fld>
             <a:endParaRPr lang="zh-CN" altLang="en-US"/>
           </a:p>
@@ -870,7 +874,7 @@
           <a:p>
             <a:fld id="{BB281D37-F1C1-421D-B41B-B00CEF0412D1}" type="datetimeFigureOut">
               <a:rPr lang="zh-CN" altLang="en-US" smtClean="0"/>
-              <a:t>2023/2/16</a:t>
+              <a:t>2023/2/25</a:t>
             </a:fld>
             <a:endParaRPr lang="zh-CN" altLang="en-US"/>
           </a:p>
@@ -1078,7 +1082,7 @@
           <a:p>
             <a:fld id="{BB281D37-F1C1-421D-B41B-B00CEF0412D1}" type="datetimeFigureOut">
               <a:rPr lang="zh-CN" altLang="en-US" smtClean="0"/>
-              <a:t>2023/2/16</a:t>
+              <a:t>2023/2/25</a:t>
             </a:fld>
             <a:endParaRPr lang="zh-CN" altLang="en-US"/>
           </a:p>
@@ -1276,7 +1280,7 @@
           <a:p>
             <a:fld id="{BB281D37-F1C1-421D-B41B-B00CEF0412D1}" type="datetimeFigureOut">
               <a:rPr lang="zh-CN" altLang="en-US" smtClean="0"/>
-              <a:t>2023/2/16</a:t>
+              <a:t>2023/2/25</a:t>
             </a:fld>
             <a:endParaRPr lang="zh-CN" altLang="en-US"/>
           </a:p>
@@ -1551,7 +1555,7 @@
           <a:p>
             <a:fld id="{BB281D37-F1C1-421D-B41B-B00CEF0412D1}" type="datetimeFigureOut">
               <a:rPr lang="zh-CN" altLang="en-US" smtClean="0"/>
-              <a:t>2023/2/16</a:t>
+              <a:t>2023/2/25</a:t>
             </a:fld>
             <a:endParaRPr lang="zh-CN" altLang="en-US"/>
           </a:p>
@@ -1816,7 +1820,7 @@
           <a:p>
             <a:fld id="{BB281D37-F1C1-421D-B41B-B00CEF0412D1}" type="datetimeFigureOut">
               <a:rPr lang="zh-CN" altLang="en-US" smtClean="0"/>
-              <a:t>2023/2/16</a:t>
+              <a:t>2023/2/25</a:t>
             </a:fld>
             <a:endParaRPr lang="zh-CN" altLang="en-US"/>
           </a:p>
@@ -2228,7 +2232,7 @@
           <a:p>
             <a:fld id="{BB281D37-F1C1-421D-B41B-B00CEF0412D1}" type="datetimeFigureOut">
               <a:rPr lang="zh-CN" altLang="en-US" smtClean="0"/>
-              <a:t>2023/2/16</a:t>
+              <a:t>2023/2/25</a:t>
             </a:fld>
             <a:endParaRPr lang="zh-CN" altLang="en-US"/>
           </a:p>
@@ -2369,7 +2373,7 @@
           <a:p>
             <a:fld id="{BB281D37-F1C1-421D-B41B-B00CEF0412D1}" type="datetimeFigureOut">
               <a:rPr lang="zh-CN" altLang="en-US" smtClean="0"/>
-              <a:t>2023/2/16</a:t>
+              <a:t>2023/2/25</a:t>
             </a:fld>
             <a:endParaRPr lang="zh-CN" altLang="en-US"/>
           </a:p>
@@ -2482,7 +2486,7 @@
           <a:p>
             <a:fld id="{BB281D37-F1C1-421D-B41B-B00CEF0412D1}" type="datetimeFigureOut">
               <a:rPr lang="zh-CN" altLang="en-US" smtClean="0"/>
-              <a:t>2023/2/16</a:t>
+              <a:t>2023/2/25</a:t>
             </a:fld>
             <a:endParaRPr lang="zh-CN" altLang="en-US"/>
           </a:p>
@@ -2793,7 +2797,7 @@
           <a:p>
             <a:fld id="{BB281D37-F1C1-421D-B41B-B00CEF0412D1}" type="datetimeFigureOut">
               <a:rPr lang="zh-CN" altLang="en-US" smtClean="0"/>
-              <a:t>2023/2/16</a:t>
+              <a:t>2023/2/25</a:t>
             </a:fld>
             <a:endParaRPr lang="zh-CN" altLang="en-US"/>
           </a:p>
@@ -3081,7 +3085,7 @@
           <a:p>
             <a:fld id="{BB281D37-F1C1-421D-B41B-B00CEF0412D1}" type="datetimeFigureOut">
               <a:rPr lang="zh-CN" altLang="en-US" smtClean="0"/>
-              <a:t>2023/2/16</a:t>
+              <a:t>2023/2/25</a:t>
             </a:fld>
             <a:endParaRPr lang="zh-CN" altLang="en-US"/>
           </a:p>
@@ -3322,7 +3326,7 @@
           <a:p>
             <a:fld id="{BB281D37-F1C1-421D-B41B-B00CEF0412D1}" type="datetimeFigureOut">
               <a:rPr lang="zh-CN" altLang="en-US" smtClean="0"/>
-              <a:t>2023/2/16</a:t>
+              <a:t>2023/2/25</a:t>
             </a:fld>
             <a:endParaRPr lang="zh-CN" altLang="en-US"/>
           </a:p>
@@ -3848,6 +3852,187 @@
           <p:cNvPr id="2" name="标题 1">
             <a:extLst>
               <a:ext uri="{FF2B5EF4-FFF2-40B4-BE49-F238E27FC236}">
+                <a16:creationId xmlns:a16="http://schemas.microsoft.com/office/drawing/2014/main" id="{74754402-D2AD-57CA-DB5F-525593617B2F}"/>
+              </a:ext>
+            </a:extLst>
+          </p:cNvPr>
+          <p:cNvSpPr>
+            <a:spLocks noGrp="1"/>
+          </p:cNvSpPr>
+          <p:nvPr>
+            <p:ph type="title"/>
+          </p:nvPr>
+        </p:nvSpPr>
+        <p:spPr/>
+        <p:txBody>
+          <a:bodyPr/>
+          <a:lstStyle/>
+          <a:p>
+            <a:r>
+              <a:rPr lang="es-ES" altLang="zh-CN" dirty="0"/>
+              <a:t>Resultado esperado en funcionamiento del proyecto Angular</a:t>
+            </a:r>
+            <a:endParaRPr lang="zh-CN" altLang="en-US" dirty="0"/>
+          </a:p>
+        </p:txBody>
+      </p:sp>
+      <p:pic>
+        <p:nvPicPr>
+          <p:cNvPr id="5" name="内容占位符 4">
+            <a:extLst>
+              <a:ext uri="{FF2B5EF4-FFF2-40B4-BE49-F238E27FC236}">
+                <a16:creationId xmlns:a16="http://schemas.microsoft.com/office/drawing/2014/main" id="{7FD37CA6-3DA5-01E1-48E4-DD0A60D84B5C}"/>
+              </a:ext>
+            </a:extLst>
+          </p:cNvPr>
+          <p:cNvPicPr>
+            <a:picLocks noGrp="1" noChangeAspect="1"/>
+          </p:cNvPicPr>
+          <p:nvPr>
+            <p:ph idx="1"/>
+          </p:nvPr>
+        </p:nvPicPr>
+        <p:blipFill>
+          <a:blip r:embed="rId2"/>
+          <a:stretch>
+            <a:fillRect/>
+          </a:stretch>
+        </p:blipFill>
+        <p:spPr>
+          <a:xfrm>
+            <a:off x="3138487" y="2143919"/>
+            <a:ext cx="5915025" cy="3714750"/>
+          </a:xfrm>
+        </p:spPr>
+      </p:pic>
+    </p:spTree>
+    <p:extLst>
+      <p:ext uri="{BB962C8B-B14F-4D97-AF65-F5344CB8AC3E}">
+        <p14:creationId xmlns:p14="http://schemas.microsoft.com/office/powerpoint/2010/main" val="507046957"/>
+      </p:ext>
+    </p:extLst>
+  </p:cSld>
+  <p:clrMapOvr>
+    <a:masterClrMapping/>
+  </p:clrMapOvr>
+</p:sld>
+</file>
+
+<file path=ppt/slides/slide11.xml><?xml version="1.0" encoding="utf-8"?>
+<p:sld xmlns:a="http://schemas.openxmlformats.org/drawingml/2006/main" xmlns:r="http://schemas.openxmlformats.org/officeDocument/2006/relationships" xmlns:p="http://schemas.openxmlformats.org/presentationml/2006/main">
+  <p:cSld>
+    <p:spTree>
+      <p:nvGrpSpPr>
+        <p:cNvPr id="1" name=""/>
+        <p:cNvGrpSpPr/>
+        <p:nvPr/>
+      </p:nvGrpSpPr>
+      <p:grpSpPr>
+        <a:xfrm>
+          <a:off x="0" y="0"/>
+          <a:ext cx="0" cy="0"/>
+          <a:chOff x="0" y="0"/>
+          <a:chExt cx="0" cy="0"/>
+        </a:xfrm>
+      </p:grpSpPr>
+      <p:sp>
+        <p:nvSpPr>
+          <p:cNvPr id="2" name="标题 1">
+            <a:extLst>
+              <a:ext uri="{FF2B5EF4-FFF2-40B4-BE49-F238E27FC236}">
+                <a16:creationId xmlns:a16="http://schemas.microsoft.com/office/drawing/2014/main" id="{1C90C7C1-2A2D-AA2E-970D-7EA29D82795A}"/>
+              </a:ext>
+            </a:extLst>
+          </p:cNvPr>
+          <p:cNvSpPr>
+            <a:spLocks noGrp="1"/>
+          </p:cNvSpPr>
+          <p:nvPr>
+            <p:ph type="title"/>
+          </p:nvPr>
+        </p:nvSpPr>
+        <p:spPr/>
+        <p:txBody>
+          <a:bodyPr/>
+          <a:lstStyle/>
+          <a:p>
+            <a:r>
+              <a:rPr lang="es-ES" altLang="zh-CN" dirty="0"/>
+              <a:t>Código de </a:t>
+            </a:r>
+            <a:r>
+              <a:rPr lang="es-ES" altLang="zh-CN" dirty="0" err="1"/>
+              <a:t>tranformación</a:t>
+            </a:r>
+            <a:endParaRPr lang="zh-CN" altLang="en-US" dirty="0"/>
+          </a:p>
+        </p:txBody>
+      </p:sp>
+      <p:pic>
+        <p:nvPicPr>
+          <p:cNvPr id="9" name="图片 8">
+            <a:extLst>
+              <a:ext uri="{FF2B5EF4-FFF2-40B4-BE49-F238E27FC236}">
+                <a16:creationId xmlns:a16="http://schemas.microsoft.com/office/drawing/2014/main" id="{9B6F37E1-185D-16EA-2089-D80542AFC686}"/>
+              </a:ext>
+            </a:extLst>
+          </p:cNvPr>
+          <p:cNvPicPr>
+            <a:picLocks noChangeAspect="1"/>
+          </p:cNvPicPr>
+          <p:nvPr/>
+        </p:nvPicPr>
+        <p:blipFill>
+          <a:blip r:embed="rId2"/>
+          <a:stretch>
+            <a:fillRect/>
+          </a:stretch>
+        </p:blipFill>
+        <p:spPr>
+          <a:xfrm>
+            <a:off x="838200" y="1554480"/>
+            <a:ext cx="8082932" cy="4836160"/>
+          </a:xfrm>
+          <a:prstGeom prst="rect">
+            <a:avLst/>
+          </a:prstGeom>
+        </p:spPr>
+      </p:pic>
+    </p:spTree>
+    <p:extLst>
+      <p:ext uri="{BB962C8B-B14F-4D97-AF65-F5344CB8AC3E}">
+        <p14:creationId xmlns:p14="http://schemas.microsoft.com/office/powerpoint/2010/main" val="365040505"/>
+      </p:ext>
+    </p:extLst>
+  </p:cSld>
+  <p:clrMapOvr>
+    <a:masterClrMapping/>
+  </p:clrMapOvr>
+</p:sld>
+</file>
+
+<file path=ppt/slides/slide12.xml><?xml version="1.0" encoding="utf-8"?>
+<p:sld xmlns:a="http://schemas.openxmlformats.org/drawingml/2006/main" xmlns:r="http://schemas.openxmlformats.org/officeDocument/2006/relationships" xmlns:p="http://schemas.openxmlformats.org/presentationml/2006/main">
+  <p:cSld>
+    <p:spTree>
+      <p:nvGrpSpPr>
+        <p:cNvPr id="1" name=""/>
+        <p:cNvGrpSpPr/>
+        <p:nvPr/>
+      </p:nvGrpSpPr>
+      <p:grpSpPr>
+        <a:xfrm>
+          <a:off x="0" y="0"/>
+          <a:ext cx="0" cy="0"/>
+          <a:chOff x="0" y="0"/>
+          <a:chExt cx="0" cy="0"/>
+        </a:xfrm>
+      </p:grpSpPr>
+      <p:sp>
+        <p:nvSpPr>
+          <p:cNvPr id="2" name="标题 1">
+            <a:extLst>
+              <a:ext uri="{FF2B5EF4-FFF2-40B4-BE49-F238E27FC236}">
                 <a16:creationId xmlns:a16="http://schemas.microsoft.com/office/drawing/2014/main" id="{57A4AFC8-3878-297D-75DB-1C21F005AED0}"/>
               </a:ext>
             </a:extLst>
@@ -3944,7 +4129,7 @@
 </p:sld>
 </file>
 
-<file path=ppt/slides/slide11.xml><?xml version="1.0" encoding="utf-8"?>
+<file path=ppt/slides/slide13.xml><?xml version="1.0" encoding="utf-8"?>
 <p:sld xmlns:a="http://schemas.openxmlformats.org/drawingml/2006/main" xmlns:r="http://schemas.openxmlformats.org/officeDocument/2006/relationships" xmlns:p="http://schemas.openxmlformats.org/presentationml/2006/main">
   <p:cSld>
     <p:spTree>
@@ -4037,7 +4222,7 @@
 </p:sld>
 </file>
 
-<file path=ppt/slides/slide12.xml><?xml version="1.0" encoding="utf-8"?>
+<file path=ppt/slides/slide14.xml><?xml version="1.0" encoding="utf-8"?>
 <p:sld xmlns:a="http://schemas.openxmlformats.org/drawingml/2006/main" xmlns:r="http://schemas.openxmlformats.org/officeDocument/2006/relationships" xmlns:p="http://schemas.openxmlformats.org/presentationml/2006/main">
   <p:cSld>
     <p:spTree>
@@ -4129,7 +4314,7 @@
 </p:sld>
 </file>
 
-<file path=ppt/slides/slide13.xml><?xml version="1.0" encoding="utf-8"?>
+<file path=ppt/slides/slide15.xml><?xml version="1.0" encoding="utf-8"?>
 <p:sld xmlns:a="http://schemas.openxmlformats.org/drawingml/2006/main" xmlns:r="http://schemas.openxmlformats.org/officeDocument/2006/relationships" xmlns:p="http://schemas.openxmlformats.org/presentationml/2006/main">
   <p:cSld>
     <p:spTree>
@@ -4247,7 +4432,7 @@
 </p:sld>
 </file>
 
-<file path=ppt/slides/slide14.xml><?xml version="1.0" encoding="utf-8"?>
+<file path=ppt/slides/slide16.xml><?xml version="1.0" encoding="utf-8"?>
 <p:sld xmlns:a="http://schemas.openxmlformats.org/drawingml/2006/main" xmlns:r="http://schemas.openxmlformats.org/officeDocument/2006/relationships" xmlns:p="http://schemas.openxmlformats.org/presentationml/2006/main">
   <p:cSld>
     <p:spTree>
@@ -4420,7 +4605,7 @@
 </p:sld>
 </file>
 
-<file path=ppt/slides/slide15.xml><?xml version="1.0" encoding="utf-8"?>
+<file path=ppt/slides/slide17.xml><?xml version="1.0" encoding="utf-8"?>
 <p:sld xmlns:a="http://schemas.openxmlformats.org/drawingml/2006/main" xmlns:r="http://schemas.openxmlformats.org/officeDocument/2006/relationships" xmlns:p="http://schemas.openxmlformats.org/presentationml/2006/main">
   <p:cSld>
     <p:spTree>
@@ -4539,7 +4724,7 @@
 </p:sld>
 </file>
 
-<file path=ppt/slides/slide16.xml><?xml version="1.0" encoding="utf-8"?>
+<file path=ppt/slides/slide18.xml><?xml version="1.0" encoding="utf-8"?>
 <p:sld xmlns:a="http://schemas.openxmlformats.org/drawingml/2006/main" xmlns:r="http://schemas.openxmlformats.org/officeDocument/2006/relationships" xmlns:p="http://schemas.openxmlformats.org/presentationml/2006/main">
   <p:cSld>
     <p:spTree>
@@ -4658,7 +4843,7 @@
 </p:sld>
 </file>
 
-<file path=ppt/slides/slide17.xml><?xml version="1.0" encoding="utf-8"?>
+<file path=ppt/slides/slide19.xml><?xml version="1.0" encoding="utf-8"?>
 <p:sld xmlns:a="http://schemas.openxmlformats.org/drawingml/2006/main" xmlns:r="http://schemas.openxmlformats.org/officeDocument/2006/relationships" xmlns:p="http://schemas.openxmlformats.org/presentationml/2006/main">
   <p:cSld>
     <p:spTree>
@@ -5453,6 +5638,216 @@
           <p:cNvPr id="2" name="标题 1">
             <a:extLst>
               <a:ext uri="{FF2B5EF4-FFF2-40B4-BE49-F238E27FC236}">
+                <a16:creationId xmlns:a16="http://schemas.microsoft.com/office/drawing/2014/main" id="{EEFBCD4B-73CE-C029-9270-A3192BBCC954}"/>
+              </a:ext>
+            </a:extLst>
+          </p:cNvPr>
+          <p:cNvSpPr>
+            <a:spLocks noGrp="1"/>
+          </p:cNvSpPr>
+          <p:nvPr>
+            <p:ph type="title"/>
+          </p:nvPr>
+        </p:nvSpPr>
+        <p:spPr/>
+        <p:txBody>
+          <a:bodyPr/>
+          <a:lstStyle/>
+          <a:p>
+            <a:r>
+              <a:rPr lang="en-US" altLang="zh-CN" dirty="0" err="1"/>
+              <a:t>Diagrama</a:t>
+            </a:r>
+            <a:r>
+              <a:rPr lang="en-US" altLang="zh-CN" dirty="0"/>
+              <a:t> de </a:t>
+            </a:r>
+            <a:r>
+              <a:rPr lang="en-US" altLang="zh-CN" dirty="0" err="1"/>
+              <a:t>clases</a:t>
+            </a:r>
+            <a:r>
+              <a:rPr lang="en-US" altLang="zh-CN" dirty="0"/>
+              <a:t>  - El </a:t>
+            </a:r>
+            <a:r>
+              <a:rPr lang="en-US" altLang="zh-CN" dirty="0" err="1"/>
+              <a:t>metamodelo</a:t>
+            </a:r>
+            <a:endParaRPr lang="zh-CN" altLang="en-US" dirty="0"/>
+          </a:p>
+        </p:txBody>
+      </p:sp>
+      <p:pic>
+        <p:nvPicPr>
+          <p:cNvPr id="5" name="内容占位符 4">
+            <a:extLst>
+              <a:ext uri="{FF2B5EF4-FFF2-40B4-BE49-F238E27FC236}">
+                <a16:creationId xmlns:a16="http://schemas.microsoft.com/office/drawing/2014/main" id="{479121A1-84A7-25E0-C1DB-B9308E7FE5A6}"/>
+              </a:ext>
+            </a:extLst>
+          </p:cNvPr>
+          <p:cNvPicPr>
+            <a:picLocks noGrp="1" noChangeAspect="1"/>
+          </p:cNvPicPr>
+          <p:nvPr>
+            <p:ph idx="1"/>
+          </p:nvPr>
+        </p:nvPicPr>
+        <p:blipFill>
+          <a:blip r:embed="rId2">
+            <a:extLst>
+              <a:ext uri="{28A0092B-C50C-407E-A947-70E740481C1C}">
+                <a14:useLocalDpi xmlns:a14="http://schemas.microsoft.com/office/drawing/2010/main" val="0"/>
+              </a:ext>
+            </a:extLst>
+          </a:blip>
+          <a:stretch>
+            <a:fillRect/>
+          </a:stretch>
+        </p:blipFill>
+        <p:spPr>
+          <a:xfrm>
+            <a:off x="2790333" y="1507937"/>
+            <a:ext cx="7032980" cy="5350063"/>
+          </a:xfrm>
+        </p:spPr>
+      </p:pic>
+    </p:spTree>
+    <p:extLst>
+      <p:ext uri="{BB962C8B-B14F-4D97-AF65-F5344CB8AC3E}">
+        <p14:creationId xmlns:p14="http://schemas.microsoft.com/office/powerpoint/2010/main" val="202337229"/>
+      </p:ext>
+    </p:extLst>
+  </p:cSld>
+  <p:clrMapOvr>
+    <a:masterClrMapping/>
+  </p:clrMapOvr>
+</p:sld>
+</file>
+
+<file path=ppt/slides/slide5.xml><?xml version="1.0" encoding="utf-8"?>
+<p:sld xmlns:a="http://schemas.openxmlformats.org/drawingml/2006/main" xmlns:r="http://schemas.openxmlformats.org/officeDocument/2006/relationships" xmlns:p="http://schemas.openxmlformats.org/presentationml/2006/main">
+  <p:cSld>
+    <p:spTree>
+      <p:nvGrpSpPr>
+        <p:cNvPr id="1" name=""/>
+        <p:cNvGrpSpPr/>
+        <p:nvPr/>
+      </p:nvGrpSpPr>
+      <p:grpSpPr>
+        <a:xfrm>
+          <a:off x="0" y="0"/>
+          <a:ext cx="0" cy="0"/>
+          <a:chOff x="0" y="0"/>
+          <a:chExt cx="0" cy="0"/>
+        </a:xfrm>
+      </p:grpSpPr>
+      <p:sp>
+        <p:nvSpPr>
+          <p:cNvPr id="2" name="标题 1">
+            <a:extLst>
+              <a:ext uri="{FF2B5EF4-FFF2-40B4-BE49-F238E27FC236}">
+                <a16:creationId xmlns:a16="http://schemas.microsoft.com/office/drawing/2014/main" id="{609BBD28-F9CA-DF24-CBDA-FF7F9D3E9BFC}"/>
+              </a:ext>
+            </a:extLst>
+          </p:cNvPr>
+          <p:cNvSpPr>
+            <a:spLocks noGrp="1"/>
+          </p:cNvSpPr>
+          <p:nvPr>
+            <p:ph type="title"/>
+          </p:nvPr>
+        </p:nvSpPr>
+        <p:spPr/>
+        <p:txBody>
+          <a:bodyPr/>
+          <a:lstStyle/>
+          <a:p>
+            <a:r>
+              <a:rPr lang="en-US" altLang="zh-CN" dirty="0" err="1"/>
+              <a:t>Representaci</a:t>
+            </a:r>
+            <a:r>
+              <a:rPr lang="es-ES" altLang="zh-CN" dirty="0" err="1"/>
+              <a:t>ón</a:t>
+            </a:r>
+            <a:r>
+              <a:rPr lang="es-ES" altLang="zh-CN" dirty="0"/>
+              <a:t> de una instancia en Página</a:t>
+            </a:r>
+            <a:endParaRPr lang="zh-CN" altLang="en-US" dirty="0"/>
+          </a:p>
+        </p:txBody>
+      </p:sp>
+      <p:sp>
+        <p:nvSpPr>
+          <p:cNvPr id="3" name="内容占位符 2">
+            <a:extLst>
+              <a:ext uri="{FF2B5EF4-FFF2-40B4-BE49-F238E27FC236}">
+                <a16:creationId xmlns:a16="http://schemas.microsoft.com/office/drawing/2014/main" id="{66F29FF9-932C-B014-1E56-9FF0076A56A9}"/>
+              </a:ext>
+            </a:extLst>
+          </p:cNvPr>
+          <p:cNvSpPr>
+            <a:spLocks noGrp="1"/>
+          </p:cNvSpPr>
+          <p:nvPr>
+            <p:ph idx="1"/>
+          </p:nvPr>
+        </p:nvSpPr>
+        <p:spPr/>
+        <p:txBody>
+          <a:bodyPr/>
+          <a:lstStyle/>
+          <a:p>
+            <a:r>
+              <a:rPr lang="es-ES" altLang="zh-CN" dirty="0"/>
+              <a:t>Asociar los componentes de una instancia con los componentes que hay </a:t>
+            </a:r>
+            <a:r>
+              <a:rPr lang="es-ES" altLang="zh-CN"/>
+              <a:t>en una página</a:t>
+            </a:r>
+            <a:endParaRPr lang="zh-CN" altLang="en-US" dirty="0"/>
+          </a:p>
+        </p:txBody>
+      </p:sp>
+    </p:spTree>
+    <p:extLst>
+      <p:ext uri="{BB962C8B-B14F-4D97-AF65-F5344CB8AC3E}">
+        <p14:creationId xmlns:p14="http://schemas.microsoft.com/office/powerpoint/2010/main" val="3423992613"/>
+      </p:ext>
+    </p:extLst>
+  </p:cSld>
+  <p:clrMapOvr>
+    <a:masterClrMapping/>
+  </p:clrMapOvr>
+</p:sld>
+</file>
+
+<file path=ppt/slides/slide6.xml><?xml version="1.0" encoding="utf-8"?>
+<p:sld xmlns:a="http://schemas.openxmlformats.org/drawingml/2006/main" xmlns:r="http://schemas.openxmlformats.org/officeDocument/2006/relationships" xmlns:p="http://schemas.openxmlformats.org/presentationml/2006/main">
+  <p:cSld>
+    <p:spTree>
+      <p:nvGrpSpPr>
+        <p:cNvPr id="1" name=""/>
+        <p:cNvGrpSpPr/>
+        <p:nvPr/>
+      </p:nvGrpSpPr>
+      <p:grpSpPr>
+        <a:xfrm>
+          <a:off x="0" y="0"/>
+          <a:ext cx="0" cy="0"/>
+          <a:chOff x="0" y="0"/>
+          <a:chExt cx="0" cy="0"/>
+        </a:xfrm>
+      </p:grpSpPr>
+      <p:sp>
+        <p:nvSpPr>
+          <p:cNvPr id="2" name="标题 1">
+            <a:extLst>
+              <a:ext uri="{FF2B5EF4-FFF2-40B4-BE49-F238E27FC236}">
                 <a16:creationId xmlns:a16="http://schemas.microsoft.com/office/drawing/2014/main" id="{F3B9DFBB-27F7-1320-1C5F-BD38C4158F4D}"/>
               </a:ext>
             </a:extLst>
@@ -5725,7 +6120,7 @@
 </p:sld>
 </file>
 
-<file path=ppt/slides/slide5.xml><?xml version="1.0" encoding="utf-8"?>
+<file path=ppt/slides/slide7.xml><?xml version="1.0" encoding="utf-8"?>
 <p:sld xmlns:a="http://schemas.openxmlformats.org/drawingml/2006/main" xmlns:r="http://schemas.openxmlformats.org/officeDocument/2006/relationships" xmlns:p="http://schemas.openxmlformats.org/presentationml/2006/main">
   <p:cSld>
     <p:spTree>
@@ -5889,7 +6284,7 @@
 </p:sld>
 </file>
 
-<file path=ppt/slides/slide6.xml><?xml version="1.0" encoding="utf-8"?>
+<file path=ppt/slides/slide8.xml><?xml version="1.0" encoding="utf-8"?>
 <p:sld xmlns:a="http://schemas.openxmlformats.org/drawingml/2006/main" xmlns:r="http://schemas.openxmlformats.org/officeDocument/2006/relationships" xmlns:p="http://schemas.openxmlformats.org/presentationml/2006/main">
   <p:cSld>
     <p:spTree>
@@ -6083,7 +6478,7 @@
 </p:sld>
 </file>
 
-<file path=ppt/slides/slide7.xml><?xml version="1.0" encoding="utf-8"?>
+<file path=ppt/slides/slide9.xml><?xml version="1.0" encoding="utf-8"?>
 <p:sld xmlns:a="http://schemas.openxmlformats.org/drawingml/2006/main" xmlns:r="http://schemas.openxmlformats.org/officeDocument/2006/relationships" xmlns:p="http://schemas.openxmlformats.org/presentationml/2006/main">
   <p:cSld>
     <p:spTree>
@@ -6253,187 +6648,6 @@
     <p:extLst>
       <p:ext uri="{BB962C8B-B14F-4D97-AF65-F5344CB8AC3E}">
         <p14:creationId xmlns:p14="http://schemas.microsoft.com/office/powerpoint/2010/main" val="163172574"/>
-      </p:ext>
-    </p:extLst>
-  </p:cSld>
-  <p:clrMapOvr>
-    <a:masterClrMapping/>
-  </p:clrMapOvr>
-</p:sld>
-</file>
-
-<file path=ppt/slides/slide8.xml><?xml version="1.0" encoding="utf-8"?>
-<p:sld xmlns:a="http://schemas.openxmlformats.org/drawingml/2006/main" xmlns:r="http://schemas.openxmlformats.org/officeDocument/2006/relationships" xmlns:p="http://schemas.openxmlformats.org/presentationml/2006/main">
-  <p:cSld>
-    <p:spTree>
-      <p:nvGrpSpPr>
-        <p:cNvPr id="1" name=""/>
-        <p:cNvGrpSpPr/>
-        <p:nvPr/>
-      </p:nvGrpSpPr>
-      <p:grpSpPr>
-        <a:xfrm>
-          <a:off x="0" y="0"/>
-          <a:ext cx="0" cy="0"/>
-          <a:chOff x="0" y="0"/>
-          <a:chExt cx="0" cy="0"/>
-        </a:xfrm>
-      </p:grpSpPr>
-      <p:sp>
-        <p:nvSpPr>
-          <p:cNvPr id="2" name="标题 1">
-            <a:extLst>
-              <a:ext uri="{FF2B5EF4-FFF2-40B4-BE49-F238E27FC236}">
-                <a16:creationId xmlns:a16="http://schemas.microsoft.com/office/drawing/2014/main" id="{74754402-D2AD-57CA-DB5F-525593617B2F}"/>
-              </a:ext>
-            </a:extLst>
-          </p:cNvPr>
-          <p:cNvSpPr>
-            <a:spLocks noGrp="1"/>
-          </p:cNvSpPr>
-          <p:nvPr>
-            <p:ph type="title"/>
-          </p:nvPr>
-        </p:nvSpPr>
-        <p:spPr/>
-        <p:txBody>
-          <a:bodyPr/>
-          <a:lstStyle/>
-          <a:p>
-            <a:r>
-              <a:rPr lang="es-ES" altLang="zh-CN" dirty="0"/>
-              <a:t>Resultado esperado en funcionamiento del proyecto Angular</a:t>
-            </a:r>
-            <a:endParaRPr lang="zh-CN" altLang="en-US" dirty="0"/>
-          </a:p>
-        </p:txBody>
-      </p:sp>
-      <p:pic>
-        <p:nvPicPr>
-          <p:cNvPr id="5" name="内容占位符 4">
-            <a:extLst>
-              <a:ext uri="{FF2B5EF4-FFF2-40B4-BE49-F238E27FC236}">
-                <a16:creationId xmlns:a16="http://schemas.microsoft.com/office/drawing/2014/main" id="{7FD37CA6-3DA5-01E1-48E4-DD0A60D84B5C}"/>
-              </a:ext>
-            </a:extLst>
-          </p:cNvPr>
-          <p:cNvPicPr>
-            <a:picLocks noGrp="1" noChangeAspect="1"/>
-          </p:cNvPicPr>
-          <p:nvPr>
-            <p:ph idx="1"/>
-          </p:nvPr>
-        </p:nvPicPr>
-        <p:blipFill>
-          <a:blip r:embed="rId2"/>
-          <a:stretch>
-            <a:fillRect/>
-          </a:stretch>
-        </p:blipFill>
-        <p:spPr>
-          <a:xfrm>
-            <a:off x="3138487" y="2143919"/>
-            <a:ext cx="5915025" cy="3714750"/>
-          </a:xfrm>
-        </p:spPr>
-      </p:pic>
-    </p:spTree>
-    <p:extLst>
-      <p:ext uri="{BB962C8B-B14F-4D97-AF65-F5344CB8AC3E}">
-        <p14:creationId xmlns:p14="http://schemas.microsoft.com/office/powerpoint/2010/main" val="507046957"/>
-      </p:ext>
-    </p:extLst>
-  </p:cSld>
-  <p:clrMapOvr>
-    <a:masterClrMapping/>
-  </p:clrMapOvr>
-</p:sld>
-</file>
-
-<file path=ppt/slides/slide9.xml><?xml version="1.0" encoding="utf-8"?>
-<p:sld xmlns:a="http://schemas.openxmlformats.org/drawingml/2006/main" xmlns:r="http://schemas.openxmlformats.org/officeDocument/2006/relationships" xmlns:p="http://schemas.openxmlformats.org/presentationml/2006/main">
-  <p:cSld>
-    <p:spTree>
-      <p:nvGrpSpPr>
-        <p:cNvPr id="1" name=""/>
-        <p:cNvGrpSpPr/>
-        <p:nvPr/>
-      </p:nvGrpSpPr>
-      <p:grpSpPr>
-        <a:xfrm>
-          <a:off x="0" y="0"/>
-          <a:ext cx="0" cy="0"/>
-          <a:chOff x="0" y="0"/>
-          <a:chExt cx="0" cy="0"/>
-        </a:xfrm>
-      </p:grpSpPr>
-      <p:sp>
-        <p:nvSpPr>
-          <p:cNvPr id="2" name="标题 1">
-            <a:extLst>
-              <a:ext uri="{FF2B5EF4-FFF2-40B4-BE49-F238E27FC236}">
-                <a16:creationId xmlns:a16="http://schemas.microsoft.com/office/drawing/2014/main" id="{1C90C7C1-2A2D-AA2E-970D-7EA29D82795A}"/>
-              </a:ext>
-            </a:extLst>
-          </p:cNvPr>
-          <p:cNvSpPr>
-            <a:spLocks noGrp="1"/>
-          </p:cNvSpPr>
-          <p:nvPr>
-            <p:ph type="title"/>
-          </p:nvPr>
-        </p:nvSpPr>
-        <p:spPr/>
-        <p:txBody>
-          <a:bodyPr/>
-          <a:lstStyle/>
-          <a:p>
-            <a:r>
-              <a:rPr lang="es-ES" altLang="zh-CN" dirty="0"/>
-              <a:t>Código de </a:t>
-            </a:r>
-            <a:r>
-              <a:rPr lang="es-ES" altLang="zh-CN" dirty="0" err="1"/>
-              <a:t>tranformación</a:t>
-            </a:r>
-            <a:endParaRPr lang="zh-CN" altLang="en-US" dirty="0"/>
-          </a:p>
-        </p:txBody>
-      </p:sp>
-      <p:pic>
-        <p:nvPicPr>
-          <p:cNvPr id="9" name="图片 8">
-            <a:extLst>
-              <a:ext uri="{FF2B5EF4-FFF2-40B4-BE49-F238E27FC236}">
-                <a16:creationId xmlns:a16="http://schemas.microsoft.com/office/drawing/2014/main" id="{9B6F37E1-185D-16EA-2089-D80542AFC686}"/>
-              </a:ext>
-            </a:extLst>
-          </p:cNvPr>
-          <p:cNvPicPr>
-            <a:picLocks noChangeAspect="1"/>
-          </p:cNvPicPr>
-          <p:nvPr/>
-        </p:nvPicPr>
-        <p:blipFill>
-          <a:blip r:embed="rId2"/>
-          <a:stretch>
-            <a:fillRect/>
-          </a:stretch>
-        </p:blipFill>
-        <p:spPr>
-          <a:xfrm>
-            <a:off x="838200" y="1554480"/>
-            <a:ext cx="8082932" cy="4836160"/>
-          </a:xfrm>
-          <a:prstGeom prst="rect">
-            <a:avLst/>
-          </a:prstGeom>
-        </p:spPr>
-      </p:pic>
-    </p:spTree>
-    <p:extLst>
-      <p:ext uri="{BB962C8B-B14F-4D97-AF65-F5344CB8AC3E}">
-        <p14:creationId xmlns:p14="http://schemas.microsoft.com/office/powerpoint/2010/main" val="365040505"/>
       </p:ext>
     </p:extLst>
   </p:cSld>

</xml_diff>